<commit_message>
simplified the cropping code and changed the cropping image to a more sophisticated one - interesting enough, it's rendered correct in POI (like in Powerpoint), but malformed in LO
git-svn-id: https://svn.apache.org/repos/asf/poi/trunk@1634749 13f79535-47bb-0310-9956-ffa450edef68
</commit_message>
<xml_diff>
--- a/test-data/slideshow/54542_cropped_bitmap.pptx
+++ b/test-data/slideshow/54542_cropped_bitmap.pptx
@@ -288,7 +288,7 @@
           <a:p>
             <a:fld id="{355FE212-34CB-7047-A540-CA6966A7F01F}" type="datetimeFigureOut">
               <a:rPr lang="en-US" smtClean="0"/>
-              <a:t>2/8/13</a:t>
+              <a:t>10/27/2014</a:t>
             </a:fld>
             <a:endParaRPr lang="en-US"/>
           </a:p>
@@ -330,7 +330,7 @@
           <a:p>
             <a:fld id="{219D9F62-9C62-EE40-AB55-CFD7D7E15A84}" type="slidenum">
               <a:rPr lang="en-US" smtClean="0"/>
-              <a:t>‹#›</a:t>
+              <a:t>‹Nr.›</a:t>
             </a:fld>
             <a:endParaRPr lang="en-US"/>
           </a:p>
@@ -458,7 +458,7 @@
           <a:p>
             <a:fld id="{355FE212-34CB-7047-A540-CA6966A7F01F}" type="datetimeFigureOut">
               <a:rPr lang="en-US" smtClean="0"/>
-              <a:t>2/8/13</a:t>
+              <a:t>10/27/2014</a:t>
             </a:fld>
             <a:endParaRPr lang="en-US"/>
           </a:p>
@@ -500,7 +500,7 @@
           <a:p>
             <a:fld id="{219D9F62-9C62-EE40-AB55-CFD7D7E15A84}" type="slidenum">
               <a:rPr lang="en-US" smtClean="0"/>
-              <a:t>‹#›</a:t>
+              <a:t>‹Nr.›</a:t>
             </a:fld>
             <a:endParaRPr lang="en-US"/>
           </a:p>
@@ -638,7 +638,7 @@
           <a:p>
             <a:fld id="{355FE212-34CB-7047-A540-CA6966A7F01F}" type="datetimeFigureOut">
               <a:rPr lang="en-US" smtClean="0"/>
-              <a:t>2/8/13</a:t>
+              <a:t>10/27/2014</a:t>
             </a:fld>
             <a:endParaRPr lang="en-US"/>
           </a:p>
@@ -680,7 +680,7 @@
           <a:p>
             <a:fld id="{219D9F62-9C62-EE40-AB55-CFD7D7E15A84}" type="slidenum">
               <a:rPr lang="en-US" smtClean="0"/>
-              <a:t>‹#›</a:t>
+              <a:t>‹Nr.›</a:t>
             </a:fld>
             <a:endParaRPr lang="en-US"/>
           </a:p>
@@ -808,7 +808,7 @@
           <a:p>
             <a:fld id="{355FE212-34CB-7047-A540-CA6966A7F01F}" type="datetimeFigureOut">
               <a:rPr lang="en-US" smtClean="0"/>
-              <a:t>2/8/13</a:t>
+              <a:t>10/27/2014</a:t>
             </a:fld>
             <a:endParaRPr lang="en-US"/>
           </a:p>
@@ -850,7 +850,7 @@
           <a:p>
             <a:fld id="{219D9F62-9C62-EE40-AB55-CFD7D7E15A84}" type="slidenum">
               <a:rPr lang="en-US" smtClean="0"/>
-              <a:t>‹#›</a:t>
+              <a:t>‹Nr.›</a:t>
             </a:fld>
             <a:endParaRPr lang="en-US"/>
           </a:p>
@@ -1054,7 +1054,7 @@
           <a:p>
             <a:fld id="{355FE212-34CB-7047-A540-CA6966A7F01F}" type="datetimeFigureOut">
               <a:rPr lang="en-US" smtClean="0"/>
-              <a:t>2/8/13</a:t>
+              <a:t>10/27/2014</a:t>
             </a:fld>
             <a:endParaRPr lang="en-US"/>
           </a:p>
@@ -1096,7 +1096,7 @@
           <a:p>
             <a:fld id="{219D9F62-9C62-EE40-AB55-CFD7D7E15A84}" type="slidenum">
               <a:rPr lang="en-US" smtClean="0"/>
-              <a:t>‹#›</a:t>
+              <a:t>‹Nr.›</a:t>
             </a:fld>
             <a:endParaRPr lang="en-US"/>
           </a:p>
@@ -1342,7 +1342,7 @@
           <a:p>
             <a:fld id="{355FE212-34CB-7047-A540-CA6966A7F01F}" type="datetimeFigureOut">
               <a:rPr lang="en-US" smtClean="0"/>
-              <a:t>2/8/13</a:t>
+              <a:t>10/27/2014</a:t>
             </a:fld>
             <a:endParaRPr lang="en-US"/>
           </a:p>
@@ -1384,7 +1384,7 @@
           <a:p>
             <a:fld id="{219D9F62-9C62-EE40-AB55-CFD7D7E15A84}" type="slidenum">
               <a:rPr lang="en-US" smtClean="0"/>
-              <a:t>‹#›</a:t>
+              <a:t>‹Nr.›</a:t>
             </a:fld>
             <a:endParaRPr lang="en-US"/>
           </a:p>
@@ -1764,7 +1764,7 @@
           <a:p>
             <a:fld id="{355FE212-34CB-7047-A540-CA6966A7F01F}" type="datetimeFigureOut">
               <a:rPr lang="en-US" smtClean="0"/>
-              <a:t>2/8/13</a:t>
+              <a:t>10/27/2014</a:t>
             </a:fld>
             <a:endParaRPr lang="en-US"/>
           </a:p>
@@ -1806,7 +1806,7 @@
           <a:p>
             <a:fld id="{219D9F62-9C62-EE40-AB55-CFD7D7E15A84}" type="slidenum">
               <a:rPr lang="en-US" smtClean="0"/>
-              <a:t>‹#›</a:t>
+              <a:t>‹Nr.›</a:t>
             </a:fld>
             <a:endParaRPr lang="en-US"/>
           </a:p>
@@ -1882,7 +1882,7 @@
           <a:p>
             <a:fld id="{355FE212-34CB-7047-A540-CA6966A7F01F}" type="datetimeFigureOut">
               <a:rPr lang="en-US" smtClean="0"/>
-              <a:t>2/8/13</a:t>
+              <a:t>10/27/2014</a:t>
             </a:fld>
             <a:endParaRPr lang="en-US"/>
           </a:p>
@@ -1924,7 +1924,7 @@
           <a:p>
             <a:fld id="{219D9F62-9C62-EE40-AB55-CFD7D7E15A84}" type="slidenum">
               <a:rPr lang="en-US" smtClean="0"/>
-              <a:t>‹#›</a:t>
+              <a:t>‹Nr.›</a:t>
             </a:fld>
             <a:endParaRPr lang="en-US"/>
           </a:p>
@@ -1977,7 +1977,7 @@
           <a:p>
             <a:fld id="{355FE212-34CB-7047-A540-CA6966A7F01F}" type="datetimeFigureOut">
               <a:rPr lang="en-US" smtClean="0"/>
-              <a:t>2/8/13</a:t>
+              <a:t>10/27/2014</a:t>
             </a:fld>
             <a:endParaRPr lang="en-US"/>
           </a:p>
@@ -2019,7 +2019,7 @@
           <a:p>
             <a:fld id="{219D9F62-9C62-EE40-AB55-CFD7D7E15A84}" type="slidenum">
               <a:rPr lang="en-US" smtClean="0"/>
-              <a:t>‹#›</a:t>
+              <a:t>‹Nr.›</a:t>
             </a:fld>
             <a:endParaRPr lang="en-US"/>
           </a:p>
@@ -2254,7 +2254,7 @@
           <a:p>
             <a:fld id="{355FE212-34CB-7047-A540-CA6966A7F01F}" type="datetimeFigureOut">
               <a:rPr lang="en-US" smtClean="0"/>
-              <a:t>2/8/13</a:t>
+              <a:t>10/27/2014</a:t>
             </a:fld>
             <a:endParaRPr lang="en-US"/>
           </a:p>
@@ -2296,7 +2296,7 @@
           <a:p>
             <a:fld id="{219D9F62-9C62-EE40-AB55-CFD7D7E15A84}" type="slidenum">
               <a:rPr lang="en-US" smtClean="0"/>
-              <a:t>‹#›</a:t>
+              <a:t>‹Nr.›</a:t>
             </a:fld>
             <a:endParaRPr lang="en-US"/>
           </a:p>
@@ -2507,7 +2507,7 @@
           <a:p>
             <a:fld id="{355FE212-34CB-7047-A540-CA6966A7F01F}" type="datetimeFigureOut">
               <a:rPr lang="en-US" smtClean="0"/>
-              <a:t>2/8/13</a:t>
+              <a:t>10/27/2014</a:t>
             </a:fld>
             <a:endParaRPr lang="en-US"/>
           </a:p>
@@ -2549,7 +2549,7 @@
           <a:p>
             <a:fld id="{219D9F62-9C62-EE40-AB55-CFD7D7E15A84}" type="slidenum">
               <a:rPr lang="en-US" smtClean="0"/>
-              <a:t>‹#›</a:t>
+              <a:t>‹Nr.›</a:t>
             </a:fld>
             <a:endParaRPr lang="en-US"/>
           </a:p>
@@ -2720,7 +2720,7 @@
           <a:p>
             <a:fld id="{355FE212-34CB-7047-A540-CA6966A7F01F}" type="datetimeFigureOut">
               <a:rPr lang="en-US" smtClean="0"/>
-              <a:t>2/8/13</a:t>
+              <a:t>10/27/2014</a:t>
             </a:fld>
             <a:endParaRPr lang="en-US"/>
           </a:p>
@@ -2798,7 +2798,7 @@
           <a:p>
             <a:fld id="{219D9F62-9C62-EE40-AB55-CFD7D7E15A84}" type="slidenum">
               <a:rPr lang="en-US" smtClean="0"/>
-              <a:t>‹#›</a:t>
+              <a:t>‹Nr.›</a:t>
             </a:fld>
             <a:endParaRPr lang="en-US"/>
           </a:p>
@@ -3352,6 +3352,179 @@
           </a:prstGeom>
         </p:spPr>
       </p:pic>
+      <p:grpSp>
+        <p:nvGrpSpPr>
+          <p:cNvPr id="4" name="Gruppieren 3"/>
+          <p:cNvGrpSpPr/>
+          <p:nvPr/>
+        </p:nvGrpSpPr>
+        <p:grpSpPr>
+          <a:xfrm rot="755916">
+            <a:off x="5715376" y="3000987"/>
+            <a:ext cx="2400367" cy="2659427"/>
+            <a:chOff x="5715376" y="3000987"/>
+            <a:chExt cx="2400367" cy="2659427"/>
+          </a:xfrm>
+        </p:grpSpPr>
+        <p:grpSp>
+          <p:nvGrpSpPr>
+            <p:cNvPr id="2" name="Gruppieren 1"/>
+            <p:cNvGrpSpPr/>
+            <p:nvPr/>
+          </p:nvGrpSpPr>
+          <p:grpSpPr>
+            <a:xfrm rot="18792219">
+              <a:off x="6333860" y="3878531"/>
+              <a:ext cx="2659427" cy="904339"/>
+              <a:chOff x="4876800" y="3956050"/>
+              <a:chExt cx="5041900" cy="1714500"/>
+            </a:xfrm>
+          </p:grpSpPr>
+          <p:sp>
+            <p:nvSpPr>
+              <p:cNvPr id="13" name="Rectangle 6"/>
+              <p:cNvSpPr/>
+              <p:nvPr/>
+            </p:nvSpPr>
+            <p:spPr>
+              <a:xfrm>
+                <a:off x="4876800" y="3956050"/>
+                <a:ext cx="5041900" cy="1612900"/>
+              </a:xfrm>
+              <a:prstGeom prst="rect">
+                <a:avLst/>
+              </a:prstGeom>
+              <a:solidFill>
+                <a:srgbClr val="3333CC"/>
+              </a:solidFill>
+            </p:spPr>
+            <p:style>
+              <a:lnRef idx="1">
+                <a:schemeClr val="accent1"/>
+              </a:lnRef>
+              <a:fillRef idx="3">
+                <a:schemeClr val="accent1"/>
+              </a:fillRef>
+              <a:effectRef idx="2">
+                <a:schemeClr val="accent1"/>
+              </a:effectRef>
+              <a:fontRef idx="minor">
+                <a:schemeClr val="lt1"/>
+              </a:fontRef>
+            </p:style>
+            <p:txBody>
+              <a:bodyPr rtlCol="0" anchor="ctr"/>
+              <a:lstStyle/>
+              <a:p>
+                <a:pPr algn="ctr"/>
+                <a:endParaRPr lang="en-US"/>
+              </a:p>
+            </p:txBody>
+          </p:sp>
+          <p:pic>
+            <p:nvPicPr>
+              <p:cNvPr id="14" name="Picture 7"/>
+              <p:cNvPicPr>
+                <a:picLocks noChangeAspect="1"/>
+              </p:cNvPicPr>
+              <p:nvPr/>
+            </p:nvPicPr>
+            <p:blipFill rotWithShape="1">
+              <a:blip r:embed="rId2"/>
+              <a:srcRect t="52941" b="-17647"/>
+              <a:stretch/>
+            </p:blipFill>
+            <p:spPr>
+              <a:xfrm>
+                <a:off x="5473700" y="4692650"/>
+                <a:ext cx="3530600" cy="977900"/>
+              </a:xfrm>
+              <a:prstGeom prst="rect">
+                <a:avLst/>
+              </a:prstGeom>
+            </p:spPr>
+          </p:pic>
+        </p:grpSp>
+        <p:grpSp>
+          <p:nvGrpSpPr>
+            <p:cNvPr id="3" name="Gruppieren 2"/>
+            <p:cNvGrpSpPr/>
+            <p:nvPr/>
+          </p:nvGrpSpPr>
+          <p:grpSpPr>
+            <a:xfrm rot="1981530">
+              <a:off x="5715376" y="3014884"/>
+              <a:ext cx="1661811" cy="351618"/>
+              <a:chOff x="749300" y="3416300"/>
+              <a:chExt cx="5041900" cy="1066800"/>
+            </a:xfrm>
+          </p:grpSpPr>
+          <p:sp>
+            <p:nvSpPr>
+              <p:cNvPr id="15" name="Rectangle 8"/>
+              <p:cNvSpPr/>
+              <p:nvPr/>
+            </p:nvSpPr>
+            <p:spPr>
+              <a:xfrm>
+                <a:off x="749300" y="3416300"/>
+                <a:ext cx="5041900" cy="1066800"/>
+              </a:xfrm>
+              <a:prstGeom prst="rect">
+                <a:avLst/>
+              </a:prstGeom>
+              <a:solidFill>
+                <a:srgbClr val="3333CC"/>
+              </a:solidFill>
+            </p:spPr>
+            <p:style>
+              <a:lnRef idx="1">
+                <a:schemeClr val="accent1"/>
+              </a:lnRef>
+              <a:fillRef idx="3">
+                <a:schemeClr val="accent1"/>
+              </a:fillRef>
+              <a:effectRef idx="2">
+                <a:schemeClr val="accent1"/>
+              </a:effectRef>
+              <a:fontRef idx="minor">
+                <a:schemeClr val="lt1"/>
+              </a:fontRef>
+            </p:style>
+            <p:txBody>
+              <a:bodyPr rtlCol="0" anchor="ctr"/>
+              <a:lstStyle/>
+              <a:p>
+                <a:pPr algn="ctr"/>
+                <a:endParaRPr lang="en-US"/>
+              </a:p>
+            </p:txBody>
+          </p:sp>
+          <p:pic>
+            <p:nvPicPr>
+              <p:cNvPr id="16" name="Picture 9"/>
+              <p:cNvPicPr>
+                <a:picLocks noChangeAspect="1"/>
+              </p:cNvPicPr>
+              <p:nvPr/>
+            </p:nvPicPr>
+            <p:blipFill rotWithShape="1">
+              <a:blip r:embed="rId2"/>
+              <a:srcRect l="2878" t="2522" r="21582" b="46217"/>
+              <a:stretch/>
+            </p:blipFill>
+            <p:spPr>
+              <a:xfrm>
+                <a:off x="1447800" y="3556000"/>
+                <a:ext cx="2666999" cy="774700"/>
+              </a:xfrm>
+              <a:prstGeom prst="rect">
+                <a:avLst/>
+              </a:prstGeom>
+            </p:spPr>
+          </p:pic>
+        </p:grpSp>
+      </p:grpSp>
     </p:spTree>
     <p:extLst>
       <p:ext uri="{BB962C8B-B14F-4D97-AF65-F5344CB8AC3E}">

</xml_diff>